<commit_message>
update on readme and poster
</commit_message>
<xml_diff>
--- a/COMP0173 CW2 Poster.pptx
+++ b/COMP0173 CW2 Poster.pptx
@@ -123,6 +123,9 @@
           </p15:clr>
         </p15:guide>
       </p15:sldGuideLst>
+    </p:ext>
+    <p:ext uri="{2D200454-40CA-4A62-9FC3-DE9A4176ACB9}">
+      <p15:notesGuideLst xmlns:p15="http://schemas.microsoft.com/office/powerpoint/2012/main"/>
     </p:ext>
   </p:extLst>
 </p:presentation>
@@ -3155,7 +3158,7 @@
           <a:p>
             <a:fld id="{545CA141-4838-4C66-B2AD-536EF6909EAE}" type="datetimeFigureOut">
               <a:rPr lang="en-GB" smtClean="0"/>
-              <a:t>10/12/2025</a:t>
+              <a:t>11/12/2025</a:t>
             </a:fld>
             <a:endParaRPr lang="en-GB"/>
           </a:p>
@@ -20757,7 +20760,7 @@
                   </a:extLst>
                 </a:hlinkClick>
               </a:rPr>
-              <a:t>https://github.com/nicholas-tobias-00/attention-u-net_for_oil-spill-detection?</a:t>
+              <a:t>https://github.com/nicholas-tobias-00/attention_unet_for_oil_spill</a:t>
             </a:r>
             <a:endParaRPr lang="en-GB" b="0" dirty="0"/>
           </a:p>
@@ -26567,15 +26570,6 @@
 </file>
 
 <file path=customXml/item2.xml><?xml version="1.0" encoding="utf-8"?>
-<?mso-contentType ?>
-<FormTemplates xmlns="http://schemas.microsoft.com/sharepoint/v3/contenttype/forms">
-  <Display>DocumentLibraryForm</Display>
-  <Edit>DocumentLibraryForm</Edit>
-  <New>DocumentLibraryForm</New>
-</FormTemplates>
-</file>
-
-<file path=customXml/item3.xml><?xml version="1.0" encoding="utf-8"?>
 <ct:contentTypeSchema xmlns:ct="http://schemas.microsoft.com/office/2006/metadata/contentType" xmlns:ma="http://schemas.microsoft.com/office/2006/metadata/properties/metaAttributes" ct:_="" ma:_="" ma:contentTypeName="Document" ma:contentTypeID="0x010100994ADD47B68F244089BBDDC01A883908" ma:contentTypeVersion="13" ma:contentTypeDescription="Create a new document." ma:contentTypeScope="" ma:versionID="1a95ec089373963790b30efd154ab720">
   <xsd:schema xmlns:xsd="http://www.w3.org/2001/XMLSchema" xmlns:xs="http://www.w3.org/2001/XMLSchema" xmlns:p="http://schemas.microsoft.com/office/2006/metadata/properties" xmlns:ns3="d5fb6ed1-db9c-48a3-a5c6-9c2d850d1a1b" xmlns:ns4="31319a9f-c50a-4d3b-8fa9-492cace4e4c3" targetNamespace="http://schemas.microsoft.com/office/2006/metadata/properties" ma:root="true" ma:fieldsID="638ba751aff1c145b5af88aaaab0b652" ns3:_="" ns4:_="">
     <xsd:import namespace="d5fb6ed1-db9c-48a3-a5c6-9c2d850d1a1b"/>
@@ -26798,6 +26792,15 @@
 </ct:contentTypeSchema>
 </file>
 
+<file path=customXml/item3.xml><?xml version="1.0" encoding="utf-8"?>
+<?mso-contentType ?>
+<FormTemplates xmlns="http://schemas.microsoft.com/sharepoint/v3/contenttype/forms">
+  <Display>DocumentLibraryForm</Display>
+  <Edit>DocumentLibraryForm</Edit>
+  <New>DocumentLibraryForm</New>
+</FormTemplates>
+</file>
+
 <file path=customXml/itemProps1.xml><?xml version="1.0" encoding="utf-8"?>
 <ds:datastoreItem xmlns:ds="http://schemas.openxmlformats.org/officeDocument/2006/customXml" ds:itemID="{CE35FEB0-B839-4E5E-AADA-024AA63178E7}">
   <ds:schemaRefs>
@@ -26816,14 +26819,6 @@
 </file>
 
 <file path=customXml/itemProps2.xml><?xml version="1.0" encoding="utf-8"?>
-<ds:datastoreItem xmlns:ds="http://schemas.openxmlformats.org/officeDocument/2006/customXml" ds:itemID="{E74005A4-B56F-4752-B379-808441D9ECD6}">
-  <ds:schemaRefs>
-    <ds:schemaRef ds:uri="http://schemas.microsoft.com/sharepoint/v3/contenttype/forms"/>
-  </ds:schemaRefs>
-</ds:datastoreItem>
-</file>
-
-<file path=customXml/itemProps3.xml><?xml version="1.0" encoding="utf-8"?>
 <ds:datastoreItem xmlns:ds="http://schemas.openxmlformats.org/officeDocument/2006/customXml" ds:itemID="{3093D280-CC88-44B2-A27A-0AE5D325F8B8}">
   <ds:schemaRefs>
     <ds:schemaRef ds:uri="http://schemas.microsoft.com/office/2006/metadata/contentType"/>
@@ -26840,4 +26835,12 @@
     <ds:schemaRef ds:uri="http://schemas.microsoft.com/internal/obd"/>
   </ds:schemaRefs>
 </ds:datastoreItem>
+</file>
+
+<file path=customXml/itemProps3.xml><?xml version="1.0" encoding="utf-8"?>
+<ds:datastoreItem xmlns:ds="http://schemas.openxmlformats.org/officeDocument/2006/customXml" ds:itemID="{E74005A4-B56F-4752-B379-808441D9ECD6}">
+  <ds:schemaRefs>
+    <ds:schemaRef ds:uri="http://schemas.microsoft.com/sharepoint/v3/contenttype/forms"/>
+  </ds:schemaRefs>
+</ds:datastoreItem>
 </file>
</xml_diff>